<commit_message>
[WIP] Update slide and demo
</commit_message>
<xml_diff>
--- a/vite/slide/NT_Vitejs.pptx
+++ b/vite/slide/NT_Vitejs.pptx
@@ -13,9 +13,20 @@
     <p:sldId id="260" r:id="rId7"/>
     <p:sldId id="261" r:id="rId8"/>
     <p:sldId id="262" r:id="rId9"/>
-    <p:sldId id="263" r:id="rId10"/>
-    <p:sldId id="264" r:id="rId11"/>
-    <p:sldId id="265" r:id="rId12"/>
+    <p:sldId id="276" r:id="rId10"/>
+    <p:sldId id="263" r:id="rId11"/>
+    <p:sldId id="264" r:id="rId12"/>
+    <p:sldId id="268" r:id="rId13"/>
+    <p:sldId id="265" r:id="rId14"/>
+    <p:sldId id="266" r:id="rId15"/>
+    <p:sldId id="267" r:id="rId16"/>
+    <p:sldId id="270" r:id="rId17"/>
+    <p:sldId id="271" r:id="rId18"/>
+    <p:sldId id="272" r:id="rId19"/>
+    <p:sldId id="273" r:id="rId20"/>
+    <p:sldId id="274" r:id="rId21"/>
+    <p:sldId id="275" r:id="rId22"/>
+    <p:sldId id="269" r:id="rId23"/>
   </p:sldIdLst>
   <p:sldSz cx="12192000" cy="6858000"/>
   <p:notesSz cx="6858000" cy="9144000"/>
@@ -19752,6 +19763,474 @@
       </p:grpSpPr>
       <p:sp>
         <p:nvSpPr>
+          <p:cNvPr id="2" name="Title 1">
+            <a:extLst>
+              <a:ext uri="{FF2B5EF4-FFF2-40B4-BE49-F238E27FC236}">
+                <a16:creationId xmlns:a16="http://schemas.microsoft.com/office/drawing/2014/main" id="{28D09562-4D8D-434E-AE6A-6CF89E6B1BBF}"/>
+              </a:ext>
+            </a:extLst>
+          </p:cNvPr>
+          <p:cNvSpPr>
+            <a:spLocks noGrp="1"/>
+          </p:cNvSpPr>
+          <p:nvPr>
+            <p:ph type="title"/>
+          </p:nvPr>
+        </p:nvSpPr>
+        <p:spPr/>
+        <p:txBody>
+          <a:bodyPr/>
+          <a:lstStyle/>
+          <a:p>
+            <a:r>
+              <a:rPr lang="en-US" dirty="0" smtClean="0"/>
+              <a:t>Vite.js</a:t>
+            </a:r>
+            <a:endParaRPr lang="en-US" dirty="0"/>
+          </a:p>
+        </p:txBody>
+      </p:sp>
+      <p:sp>
+        <p:nvSpPr>
+          <p:cNvPr id="3" name="Text Placeholder 2">
+            <a:extLst>
+              <a:ext uri="{FF2B5EF4-FFF2-40B4-BE49-F238E27FC236}">
+                <a16:creationId xmlns:a16="http://schemas.microsoft.com/office/drawing/2014/main" id="{980004BA-4F47-4C5C-B300-EF35A2F015DB}"/>
+              </a:ext>
+            </a:extLst>
+          </p:cNvPr>
+          <p:cNvSpPr>
+            <a:spLocks noGrp="1"/>
+          </p:cNvSpPr>
+          <p:nvPr>
+            <p:ph type="body" sz="quarter" idx="11"/>
+          </p:nvPr>
+        </p:nvSpPr>
+        <p:spPr/>
+        <p:txBody>
+          <a:bodyPr>
+            <a:normAutofit/>
+          </a:bodyPr>
+          <a:lstStyle/>
+          <a:p>
+            <a:r>
+              <a:rPr lang="en-US" sz="2400" dirty="0" smtClean="0"/>
+              <a:t>Native ES modules</a:t>
+            </a:r>
+          </a:p>
+        </p:txBody>
+      </p:sp>
+      <p:sp>
+        <p:nvSpPr>
+          <p:cNvPr id="6" name="TextBox 5"/>
+          <p:cNvSpPr txBox="1"/>
+          <p:nvPr/>
+        </p:nvSpPr>
+        <p:spPr>
+          <a:xfrm>
+            <a:off x="5239512" y="5122389"/>
+            <a:ext cx="1870448" cy="307777"/>
+          </a:xfrm>
+          <a:prstGeom prst="rect">
+            <a:avLst/>
+          </a:prstGeom>
+          <a:noFill/>
+        </p:spPr>
+        <p:txBody>
+          <a:bodyPr wrap="none" rtlCol="0">
+            <a:spAutoFit/>
+          </a:bodyPr>
+          <a:lstStyle/>
+          <a:p>
+            <a:pPr algn="l"/>
+            <a:r>
+              <a:rPr lang="en-US" sz="1400" i="1" dirty="0" smtClean="0">
+                <a:solidFill>
+                  <a:schemeClr val="bg2"/>
+                </a:solidFill>
+              </a:rPr>
+              <a:t>Vishnu Sivan (dev.to)</a:t>
+            </a:r>
+          </a:p>
+        </p:txBody>
+      </p:sp>
+      <p:pic>
+        <p:nvPicPr>
+          <p:cNvPr id="4" name="Picture 3"/>
+          <p:cNvPicPr>
+            <a:picLocks noChangeAspect="1"/>
+          </p:cNvPicPr>
+          <p:nvPr/>
+        </p:nvPicPr>
+        <p:blipFill>
+          <a:blip r:embed="rId2"/>
+          <a:stretch>
+            <a:fillRect/>
+          </a:stretch>
+        </p:blipFill>
+        <p:spPr>
+          <a:xfrm>
+            <a:off x="806679" y="2312720"/>
+            <a:ext cx="10736114" cy="2706652"/>
+          </a:xfrm>
+          <a:prstGeom prst="rect">
+            <a:avLst/>
+          </a:prstGeom>
+        </p:spPr>
+      </p:pic>
+      <p:sp>
+        <p:nvSpPr>
+          <p:cNvPr id="8" name="TextBox 7"/>
+          <p:cNvSpPr txBox="1"/>
+          <p:nvPr/>
+        </p:nvSpPr>
+        <p:spPr>
+          <a:xfrm>
+            <a:off x="1442639" y="1891880"/>
+            <a:ext cx="3796873" cy="369332"/>
+          </a:xfrm>
+          <a:prstGeom prst="rect">
+            <a:avLst/>
+          </a:prstGeom>
+          <a:noFill/>
+        </p:spPr>
+        <p:txBody>
+          <a:bodyPr wrap="none" rtlCol="0">
+            <a:spAutoFit/>
+          </a:bodyPr>
+          <a:lstStyle/>
+          <a:p>
+            <a:r>
+              <a:rPr lang="en-US" dirty="0" err="1" smtClean="0">
+                <a:solidFill>
+                  <a:schemeClr val="bg1"/>
+                </a:solidFill>
+              </a:rPr>
+              <a:t>Webpack</a:t>
+            </a:r>
+            <a:r>
+              <a:rPr lang="en-US" dirty="0" smtClean="0">
+                <a:solidFill>
+                  <a:schemeClr val="bg1"/>
+                </a:solidFill>
+              </a:rPr>
+              <a:t> bundles the entire project</a:t>
+            </a:r>
+          </a:p>
+        </p:txBody>
+      </p:sp>
+      <p:sp>
+        <p:nvSpPr>
+          <p:cNvPr id="9" name="TextBox 8"/>
+          <p:cNvSpPr txBox="1"/>
+          <p:nvPr/>
+        </p:nvSpPr>
+        <p:spPr>
+          <a:xfrm>
+            <a:off x="7109960" y="1891880"/>
+            <a:ext cx="3463449" cy="369332"/>
+          </a:xfrm>
+          <a:prstGeom prst="rect">
+            <a:avLst/>
+          </a:prstGeom>
+          <a:noFill/>
+        </p:spPr>
+        <p:txBody>
+          <a:bodyPr wrap="none" rtlCol="0">
+            <a:spAutoFit/>
+          </a:bodyPr>
+          <a:lstStyle/>
+          <a:p>
+            <a:r>
+              <a:rPr lang="en-US" dirty="0" err="1" smtClean="0">
+                <a:solidFill>
+                  <a:schemeClr val="bg1"/>
+                </a:solidFill>
+              </a:rPr>
+              <a:t>Vite</a:t>
+            </a:r>
+            <a:r>
+              <a:rPr lang="en-US" dirty="0" smtClean="0">
+                <a:solidFill>
+                  <a:schemeClr val="bg1"/>
+                </a:solidFill>
+              </a:rPr>
+              <a:t> only bundles needed pages</a:t>
+            </a:r>
+          </a:p>
+        </p:txBody>
+      </p:sp>
+    </p:spTree>
+    <p:extLst>
+      <p:ext uri="{BB962C8B-B14F-4D97-AF65-F5344CB8AC3E}">
+        <p14:creationId xmlns:p14="http://schemas.microsoft.com/office/powerpoint/2010/main" val="1787857065"/>
+      </p:ext>
+    </p:extLst>
+  </p:cSld>
+  <p:clrMapOvr>
+    <a:masterClrMapping/>
+  </p:clrMapOvr>
+  <p:timing>
+    <p:tnLst>
+      <p:par>
+        <p:cTn id="1" dur="indefinite" restart="never" nodeType="tmRoot"/>
+      </p:par>
+    </p:tnLst>
+  </p:timing>
+</p:sld>
+</file>
+
+<file path=ppt/slides/slide11.xml><?xml version="1.0" encoding="utf-8"?>
+<p:sld xmlns:a="http://schemas.openxmlformats.org/drawingml/2006/main" xmlns:r="http://schemas.openxmlformats.org/officeDocument/2006/relationships" xmlns:p="http://schemas.openxmlformats.org/presentationml/2006/main">
+  <p:cSld>
+    <p:spTree>
+      <p:nvGrpSpPr>
+        <p:cNvPr id="1" name=""/>
+        <p:cNvGrpSpPr/>
+        <p:nvPr/>
+      </p:nvGrpSpPr>
+      <p:grpSpPr>
+        <a:xfrm>
+          <a:off x="0" y="0"/>
+          <a:ext cx="0" cy="0"/>
+          <a:chOff x="0" y="0"/>
+          <a:chExt cx="0" cy="0"/>
+        </a:xfrm>
+      </p:grpSpPr>
+      <p:sp>
+        <p:nvSpPr>
+          <p:cNvPr id="2" name="Title 1">
+            <a:extLst>
+              <a:ext uri="{FF2B5EF4-FFF2-40B4-BE49-F238E27FC236}">
+                <a16:creationId xmlns:a16="http://schemas.microsoft.com/office/drawing/2014/main" id="{28D09562-4D8D-434E-AE6A-6CF89E6B1BBF}"/>
+              </a:ext>
+            </a:extLst>
+          </p:cNvPr>
+          <p:cNvSpPr>
+            <a:spLocks noGrp="1"/>
+          </p:cNvSpPr>
+          <p:nvPr>
+            <p:ph type="title"/>
+          </p:nvPr>
+        </p:nvSpPr>
+        <p:spPr/>
+        <p:txBody>
+          <a:bodyPr/>
+          <a:lstStyle/>
+          <a:p>
+            <a:r>
+              <a:rPr lang="en-US" dirty="0" smtClean="0"/>
+              <a:t>Vite.js</a:t>
+            </a:r>
+            <a:endParaRPr lang="en-US" dirty="0"/>
+          </a:p>
+        </p:txBody>
+      </p:sp>
+      <p:sp>
+        <p:nvSpPr>
+          <p:cNvPr id="3" name="Text Placeholder 2">
+            <a:extLst>
+              <a:ext uri="{FF2B5EF4-FFF2-40B4-BE49-F238E27FC236}">
+                <a16:creationId xmlns:a16="http://schemas.microsoft.com/office/drawing/2014/main" id="{980004BA-4F47-4C5C-B300-EF35A2F015DB}"/>
+              </a:ext>
+            </a:extLst>
+          </p:cNvPr>
+          <p:cNvSpPr>
+            <a:spLocks noGrp="1"/>
+          </p:cNvSpPr>
+          <p:nvPr>
+            <p:ph type="body" sz="quarter" idx="11"/>
+          </p:nvPr>
+        </p:nvSpPr>
+        <p:spPr/>
+        <p:txBody>
+          <a:bodyPr>
+            <a:normAutofit/>
+          </a:bodyPr>
+          <a:lstStyle/>
+          <a:p>
+            <a:pPr marL="0" indent="0">
+              <a:buNone/>
+            </a:pPr>
+            <a:r>
+              <a:rPr lang="en-US" sz="2400" dirty="0" smtClean="0"/>
+              <a:t>Performance comparison</a:t>
+            </a:r>
+            <a:endParaRPr lang="en-US" sz="2400" dirty="0" smtClean="0"/>
+          </a:p>
+        </p:txBody>
+      </p:sp>
+      <p:sp>
+        <p:nvSpPr>
+          <p:cNvPr id="8" name="TextBox 7"/>
+          <p:cNvSpPr txBox="1"/>
+          <p:nvPr/>
+        </p:nvSpPr>
+        <p:spPr>
+          <a:xfrm>
+            <a:off x="1713054" y="1930565"/>
+            <a:ext cx="2899127" cy="369332"/>
+          </a:xfrm>
+          <a:prstGeom prst="rect">
+            <a:avLst/>
+          </a:prstGeom>
+          <a:noFill/>
+        </p:spPr>
+        <p:txBody>
+          <a:bodyPr wrap="none" rtlCol="0">
+            <a:spAutoFit/>
+          </a:bodyPr>
+          <a:lstStyle/>
+          <a:p>
+            <a:r>
+              <a:rPr lang="en-US" i="1" dirty="0" smtClean="0">
+                <a:solidFill>
+                  <a:schemeClr val="bg1"/>
+                </a:solidFill>
+              </a:rPr>
+              <a:t>Create React App (11.61s)</a:t>
+            </a:r>
+            <a:endParaRPr lang="en-US" i="1" dirty="0" smtClean="0">
+              <a:solidFill>
+                <a:schemeClr val="bg1"/>
+              </a:solidFill>
+            </a:endParaRPr>
+          </a:p>
+        </p:txBody>
+      </p:sp>
+      <p:sp>
+        <p:nvSpPr>
+          <p:cNvPr id="9" name="TextBox 8"/>
+          <p:cNvSpPr txBox="1"/>
+          <p:nvPr/>
+        </p:nvSpPr>
+        <p:spPr>
+          <a:xfrm>
+            <a:off x="8144764" y="1930565"/>
+            <a:ext cx="1360309" cy="369332"/>
+          </a:xfrm>
+          <a:prstGeom prst="rect">
+            <a:avLst/>
+          </a:prstGeom>
+          <a:noFill/>
+        </p:spPr>
+        <p:txBody>
+          <a:bodyPr wrap="none" rtlCol="0">
+            <a:spAutoFit/>
+          </a:bodyPr>
+          <a:lstStyle/>
+          <a:p>
+            <a:r>
+              <a:rPr lang="en-US" i="1" dirty="0" err="1" smtClean="0">
+                <a:solidFill>
+                  <a:schemeClr val="bg1"/>
+                </a:solidFill>
+              </a:rPr>
+              <a:t>Vite</a:t>
+            </a:r>
+            <a:r>
+              <a:rPr lang="en-US" i="1" dirty="0" smtClean="0">
+                <a:solidFill>
+                  <a:schemeClr val="bg1"/>
+                </a:solidFill>
+              </a:rPr>
+              <a:t> (3.45s)</a:t>
+            </a:r>
+            <a:endParaRPr lang="en-US" i="1" dirty="0" smtClean="0">
+              <a:solidFill>
+                <a:schemeClr val="bg1"/>
+              </a:solidFill>
+            </a:endParaRPr>
+          </a:p>
+        </p:txBody>
+      </p:sp>
+      <p:pic>
+        <p:nvPicPr>
+          <p:cNvPr id="5" name="Picture 4"/>
+          <p:cNvPicPr>
+            <a:picLocks noChangeAspect="1"/>
+          </p:cNvPicPr>
+          <p:nvPr/>
+        </p:nvPicPr>
+        <p:blipFill>
+          <a:blip r:embed="rId2"/>
+          <a:stretch>
+            <a:fillRect/>
+          </a:stretch>
+        </p:blipFill>
+        <p:spPr>
+          <a:xfrm>
+            <a:off x="6518624" y="2434319"/>
+            <a:ext cx="4612590" cy="1815767"/>
+          </a:xfrm>
+          <a:prstGeom prst="rect">
+            <a:avLst/>
+          </a:prstGeom>
+        </p:spPr>
+      </p:pic>
+      <p:pic>
+        <p:nvPicPr>
+          <p:cNvPr id="7" name="Picture 6"/>
+          <p:cNvPicPr>
+            <a:picLocks noChangeAspect="1"/>
+          </p:cNvPicPr>
+          <p:nvPr/>
+        </p:nvPicPr>
+        <p:blipFill>
+          <a:blip r:embed="rId3"/>
+          <a:stretch>
+            <a:fillRect/>
+          </a:stretch>
+        </p:blipFill>
+        <p:spPr>
+          <a:xfrm>
+            <a:off x="838199" y="2434319"/>
+            <a:ext cx="4648838" cy="3675488"/>
+          </a:xfrm>
+          <a:prstGeom prst="rect">
+            <a:avLst/>
+          </a:prstGeom>
+        </p:spPr>
+      </p:pic>
+    </p:spTree>
+    <p:extLst>
+      <p:ext uri="{BB962C8B-B14F-4D97-AF65-F5344CB8AC3E}">
+        <p14:creationId xmlns:p14="http://schemas.microsoft.com/office/powerpoint/2010/main" val="508841800"/>
+      </p:ext>
+    </p:extLst>
+  </p:cSld>
+  <p:clrMapOvr>
+    <a:masterClrMapping/>
+  </p:clrMapOvr>
+  <p:timing>
+    <p:tnLst>
+      <p:par>
+        <p:cTn id="1" dur="indefinite" restart="never" nodeType="tmRoot"/>
+      </p:par>
+    </p:tnLst>
+  </p:timing>
+</p:sld>
+</file>
+
+<file path=ppt/slides/slide12.xml><?xml version="1.0" encoding="utf-8"?>
+<p:sld xmlns:a="http://schemas.openxmlformats.org/drawingml/2006/main" xmlns:r="http://schemas.openxmlformats.org/officeDocument/2006/relationships" xmlns:p="http://schemas.openxmlformats.org/presentationml/2006/main">
+  <p:cSld>
+    <p:spTree>
+      <p:nvGrpSpPr>
+        <p:cNvPr id="1" name=""/>
+        <p:cNvGrpSpPr/>
+        <p:nvPr/>
+      </p:nvGrpSpPr>
+      <p:grpSpPr>
+        <a:xfrm>
+          <a:off x="0" y="0"/>
+          <a:ext cx="0" cy="0"/>
+          <a:chOff x="0" y="0"/>
+          <a:chExt cx="0" cy="0"/>
+        </a:xfrm>
+      </p:grpSpPr>
+      <p:sp>
+        <p:nvSpPr>
           <p:cNvPr id="2" name="Text Placeholder 1">
             <a:extLst>
               <a:ext uri="{FF2B5EF4-FFF2-40B4-BE49-F238E27FC236}">
@@ -19830,6 +20309,1077 @@
   <p:clrMapOvr>
     <a:masterClrMapping/>
   </p:clrMapOvr>
+</p:sld>
+</file>
+
+<file path=ppt/slides/slide13.xml><?xml version="1.0" encoding="utf-8"?>
+<p:sld xmlns:a="http://schemas.openxmlformats.org/drawingml/2006/main" xmlns:r="http://schemas.openxmlformats.org/officeDocument/2006/relationships" xmlns:p="http://schemas.openxmlformats.org/presentationml/2006/main">
+  <p:cSld>
+    <p:spTree>
+      <p:nvGrpSpPr>
+        <p:cNvPr id="1" name=""/>
+        <p:cNvGrpSpPr/>
+        <p:nvPr/>
+      </p:nvGrpSpPr>
+      <p:grpSpPr>
+        <a:xfrm>
+          <a:off x="0" y="0"/>
+          <a:ext cx="0" cy="0"/>
+          <a:chOff x="0" y="0"/>
+          <a:chExt cx="0" cy="0"/>
+        </a:xfrm>
+      </p:grpSpPr>
+      <p:sp>
+        <p:nvSpPr>
+          <p:cNvPr id="2" name="Title 1">
+            <a:extLst>
+              <a:ext uri="{FF2B5EF4-FFF2-40B4-BE49-F238E27FC236}">
+                <a16:creationId xmlns:a16="http://schemas.microsoft.com/office/drawing/2014/main" id="{28D09562-4D8D-434E-AE6A-6CF89E6B1BBF}"/>
+              </a:ext>
+            </a:extLst>
+          </p:cNvPr>
+          <p:cNvSpPr>
+            <a:spLocks noGrp="1"/>
+          </p:cNvSpPr>
+          <p:nvPr>
+            <p:ph type="title"/>
+          </p:nvPr>
+        </p:nvSpPr>
+        <p:spPr/>
+        <p:txBody>
+          <a:bodyPr/>
+          <a:lstStyle/>
+          <a:p>
+            <a:r>
+              <a:rPr lang="en-US" dirty="0" smtClean="0"/>
+              <a:t>Advantages</a:t>
+            </a:r>
+            <a:endParaRPr lang="en-US" dirty="0"/>
+          </a:p>
+        </p:txBody>
+      </p:sp>
+      <p:sp>
+        <p:nvSpPr>
+          <p:cNvPr id="3" name="Text Placeholder 2">
+            <a:extLst>
+              <a:ext uri="{FF2B5EF4-FFF2-40B4-BE49-F238E27FC236}">
+                <a16:creationId xmlns:a16="http://schemas.microsoft.com/office/drawing/2014/main" id="{980004BA-4F47-4C5C-B300-EF35A2F015DB}"/>
+              </a:ext>
+            </a:extLst>
+          </p:cNvPr>
+          <p:cNvSpPr>
+            <a:spLocks noGrp="1"/>
+          </p:cNvSpPr>
+          <p:nvPr>
+            <p:ph type="body" sz="quarter" idx="11"/>
+          </p:nvPr>
+        </p:nvSpPr>
+        <p:spPr/>
+        <p:txBody>
+          <a:bodyPr>
+            <a:normAutofit/>
+          </a:bodyPr>
+          <a:lstStyle/>
+          <a:p>
+            <a:r>
+              <a:rPr lang="en-US" sz="2400" dirty="0" smtClean="0"/>
+              <a:t>Provides </a:t>
+            </a:r>
+            <a:r>
+              <a:rPr lang="en-US" sz="2400" dirty="0"/>
+              <a:t>lightning-fast </a:t>
+            </a:r>
+            <a:r>
+              <a:rPr lang="en-US" sz="2400" dirty="0" smtClean="0"/>
+              <a:t>start-ups</a:t>
+            </a:r>
+          </a:p>
+          <a:p>
+            <a:r>
+              <a:rPr lang="en-US" sz="2400" dirty="0"/>
+              <a:t>Sass, Less and </a:t>
+            </a:r>
+            <a:r>
+              <a:rPr lang="en-US" sz="2400" dirty="0" smtClean="0"/>
+              <a:t>Stylus support</a:t>
+            </a:r>
+          </a:p>
+          <a:p>
+            <a:r>
+              <a:rPr lang="en-US" sz="2400" dirty="0" smtClean="0"/>
+              <a:t>Multi-page </a:t>
+            </a:r>
+            <a:r>
+              <a:rPr lang="en-US" sz="2400" dirty="0"/>
+              <a:t>support</a:t>
+            </a:r>
+            <a:endParaRPr lang="en-US" sz="2400" dirty="0" smtClean="0"/>
+          </a:p>
+          <a:p>
+            <a:r>
+              <a:rPr lang="en-US" sz="2400" dirty="0" smtClean="0"/>
+              <a:t>Offers </a:t>
+            </a:r>
+            <a:r>
+              <a:rPr lang="en-US" sz="2400" dirty="0"/>
+              <a:t>templates for React, </a:t>
+            </a:r>
+            <a:r>
+              <a:rPr lang="en-US" sz="2400" dirty="0" err="1"/>
+              <a:t>Vue</a:t>
+            </a:r>
+            <a:r>
+              <a:rPr lang="en-US" sz="2400" dirty="0"/>
+              <a:t>, Svelte, Lit and Vanilla</a:t>
+            </a:r>
+            <a:endParaRPr lang="en-US" sz="2400" dirty="0"/>
+          </a:p>
+        </p:txBody>
+      </p:sp>
+    </p:spTree>
+    <p:extLst>
+      <p:ext uri="{BB962C8B-B14F-4D97-AF65-F5344CB8AC3E}">
+        <p14:creationId xmlns:p14="http://schemas.microsoft.com/office/powerpoint/2010/main" val="3650436196"/>
+      </p:ext>
+    </p:extLst>
+  </p:cSld>
+  <p:clrMapOvr>
+    <a:masterClrMapping/>
+  </p:clrMapOvr>
+  <p:timing>
+    <p:tnLst>
+      <p:par>
+        <p:cTn id="1" dur="indefinite" restart="never" nodeType="tmRoot"/>
+      </p:par>
+    </p:tnLst>
+  </p:timing>
+</p:sld>
+</file>
+
+<file path=ppt/slides/slide14.xml><?xml version="1.0" encoding="utf-8"?>
+<p:sld xmlns:a="http://schemas.openxmlformats.org/drawingml/2006/main" xmlns:r="http://schemas.openxmlformats.org/officeDocument/2006/relationships" xmlns:p="http://schemas.openxmlformats.org/presentationml/2006/main">
+  <p:cSld>
+    <p:spTree>
+      <p:nvGrpSpPr>
+        <p:cNvPr id="1" name=""/>
+        <p:cNvGrpSpPr/>
+        <p:nvPr/>
+      </p:nvGrpSpPr>
+      <p:grpSpPr>
+        <a:xfrm>
+          <a:off x="0" y="0"/>
+          <a:ext cx="0" cy="0"/>
+          <a:chOff x="0" y="0"/>
+          <a:chExt cx="0" cy="0"/>
+        </a:xfrm>
+      </p:grpSpPr>
+      <p:sp>
+        <p:nvSpPr>
+          <p:cNvPr id="2" name="Title 1">
+            <a:extLst>
+              <a:ext uri="{FF2B5EF4-FFF2-40B4-BE49-F238E27FC236}">
+                <a16:creationId xmlns:a16="http://schemas.microsoft.com/office/drawing/2014/main" id="{28D09562-4D8D-434E-AE6A-6CF89E6B1BBF}"/>
+              </a:ext>
+            </a:extLst>
+          </p:cNvPr>
+          <p:cNvSpPr>
+            <a:spLocks noGrp="1"/>
+          </p:cNvSpPr>
+          <p:nvPr>
+            <p:ph type="title"/>
+          </p:nvPr>
+        </p:nvSpPr>
+        <p:spPr/>
+        <p:txBody>
+          <a:bodyPr/>
+          <a:lstStyle/>
+          <a:p>
+            <a:r>
+              <a:rPr lang="en-US" dirty="0" smtClean="0"/>
+              <a:t>Disadvantages</a:t>
+            </a:r>
+            <a:endParaRPr lang="en-US" dirty="0"/>
+          </a:p>
+        </p:txBody>
+      </p:sp>
+      <p:sp>
+        <p:nvSpPr>
+          <p:cNvPr id="3" name="Text Placeholder 2">
+            <a:extLst>
+              <a:ext uri="{FF2B5EF4-FFF2-40B4-BE49-F238E27FC236}">
+                <a16:creationId xmlns:a16="http://schemas.microsoft.com/office/drawing/2014/main" id="{980004BA-4F47-4C5C-B300-EF35A2F015DB}"/>
+              </a:ext>
+            </a:extLst>
+          </p:cNvPr>
+          <p:cNvSpPr>
+            <a:spLocks noGrp="1"/>
+          </p:cNvSpPr>
+          <p:nvPr>
+            <p:ph type="body" sz="quarter" idx="11"/>
+          </p:nvPr>
+        </p:nvSpPr>
+        <p:spPr/>
+        <p:txBody>
+          <a:bodyPr>
+            <a:normAutofit/>
+          </a:bodyPr>
+          <a:lstStyle/>
+          <a:p>
+            <a:r>
+              <a:rPr lang="en-US" sz="2400" dirty="0"/>
+              <a:t>Limited browser </a:t>
+            </a:r>
+            <a:r>
+              <a:rPr lang="en-US" sz="2400" dirty="0" smtClean="0"/>
+              <a:t>compatibility</a:t>
+            </a:r>
+          </a:p>
+          <a:p>
+            <a:r>
+              <a:rPr lang="en-US" sz="2400" dirty="0" smtClean="0"/>
+              <a:t>Small community</a:t>
+            </a:r>
+          </a:p>
+          <a:p>
+            <a:r>
+              <a:rPr lang="en-US" sz="2400" dirty="0" smtClean="0"/>
+              <a:t>Using </a:t>
+            </a:r>
+            <a:r>
+              <a:rPr lang="en-US" sz="2400" dirty="0"/>
+              <a:t>different </a:t>
+            </a:r>
+            <a:r>
+              <a:rPr lang="en-US" sz="2400" dirty="0" smtClean="0"/>
+              <a:t>bundlers </a:t>
+            </a:r>
+            <a:r>
+              <a:rPr lang="en-US" sz="2400" dirty="0"/>
+              <a:t>for the dev and prod environment could result in </a:t>
+            </a:r>
+            <a:r>
+              <a:rPr lang="en-US" sz="2400" dirty="0" smtClean="0"/>
+              <a:t>bugs</a:t>
+            </a:r>
+          </a:p>
+          <a:p>
+            <a:r>
+              <a:rPr lang="en-US" sz="2400" dirty="0" smtClean="0"/>
+              <a:t>Lack of Jest support</a:t>
+            </a:r>
+            <a:endParaRPr lang="en-US" sz="2400" dirty="0"/>
+          </a:p>
+        </p:txBody>
+      </p:sp>
+    </p:spTree>
+    <p:extLst>
+      <p:ext uri="{BB962C8B-B14F-4D97-AF65-F5344CB8AC3E}">
+        <p14:creationId xmlns:p14="http://schemas.microsoft.com/office/powerpoint/2010/main" val="79752320"/>
+      </p:ext>
+    </p:extLst>
+  </p:cSld>
+  <p:clrMapOvr>
+    <a:masterClrMapping/>
+  </p:clrMapOvr>
+  <p:timing>
+    <p:tnLst>
+      <p:par>
+        <p:cTn id="1" dur="indefinite" restart="never" nodeType="tmRoot"/>
+      </p:par>
+    </p:tnLst>
+  </p:timing>
+</p:sld>
+</file>
+
+<file path=ppt/slides/slide15.xml><?xml version="1.0" encoding="utf-8"?>
+<p:sld xmlns:a="http://schemas.openxmlformats.org/drawingml/2006/main" xmlns:r="http://schemas.openxmlformats.org/officeDocument/2006/relationships" xmlns:p="http://schemas.openxmlformats.org/presentationml/2006/main">
+  <p:cSld>
+    <p:spTree>
+      <p:nvGrpSpPr>
+        <p:cNvPr id="1" name=""/>
+        <p:cNvGrpSpPr/>
+        <p:nvPr/>
+      </p:nvGrpSpPr>
+      <p:grpSpPr>
+        <a:xfrm>
+          <a:off x="0" y="0"/>
+          <a:ext cx="0" cy="0"/>
+          <a:chOff x="0" y="0"/>
+          <a:chExt cx="0" cy="0"/>
+        </a:xfrm>
+      </p:grpSpPr>
+      <p:sp>
+        <p:nvSpPr>
+          <p:cNvPr id="2" name="Text Placeholder 1">
+            <a:extLst>
+              <a:ext uri="{FF2B5EF4-FFF2-40B4-BE49-F238E27FC236}">
+                <a16:creationId xmlns:a16="http://schemas.microsoft.com/office/drawing/2014/main" id="{4483D1C0-AEBE-43F2-AF2A-23F080C327DF}"/>
+              </a:ext>
+            </a:extLst>
+          </p:cNvPr>
+          <p:cNvSpPr>
+            <a:spLocks noGrp="1"/>
+          </p:cNvSpPr>
+          <p:nvPr>
+            <p:ph type="body" sz="quarter" idx="15"/>
+          </p:nvPr>
+        </p:nvSpPr>
+        <p:spPr/>
+        <p:txBody>
+          <a:bodyPr/>
+          <a:lstStyle/>
+          <a:p>
+            <a:r>
+              <a:rPr lang="en-US" dirty="0" smtClean="0"/>
+              <a:t>Create a </a:t>
+            </a:r>
+            <a:r>
+              <a:rPr lang="en-US" dirty="0" err="1" smtClean="0"/>
+              <a:t>Vite</a:t>
+            </a:r>
+            <a:r>
+              <a:rPr lang="en-US" dirty="0" smtClean="0"/>
+              <a:t> project</a:t>
+            </a:r>
+            <a:endParaRPr lang="en-US" dirty="0"/>
+          </a:p>
+        </p:txBody>
+      </p:sp>
+      <p:sp>
+        <p:nvSpPr>
+          <p:cNvPr id="3" name="Text Placeholder 2">
+            <a:extLst>
+              <a:ext uri="{FF2B5EF4-FFF2-40B4-BE49-F238E27FC236}">
+                <a16:creationId xmlns:a16="http://schemas.microsoft.com/office/drawing/2014/main" id="{9BBB8D4B-E800-4849-82AC-CE4520B69691}"/>
+              </a:ext>
+            </a:extLst>
+          </p:cNvPr>
+          <p:cNvSpPr>
+            <a:spLocks noGrp="1"/>
+          </p:cNvSpPr>
+          <p:nvPr>
+            <p:ph type="body" sz="quarter" idx="16"/>
+          </p:nvPr>
+        </p:nvSpPr>
+        <p:spPr/>
+        <p:txBody>
+          <a:bodyPr/>
+          <a:lstStyle/>
+          <a:p>
+            <a:r>
+              <a:rPr lang="en-US" dirty="0" smtClean="0"/>
+              <a:t>02</a:t>
+            </a:r>
+            <a:endParaRPr lang="en-US" dirty="0"/>
+          </a:p>
+        </p:txBody>
+      </p:sp>
+    </p:spTree>
+    <p:extLst>
+      <p:ext uri="{BB962C8B-B14F-4D97-AF65-F5344CB8AC3E}">
+        <p14:creationId xmlns:p14="http://schemas.microsoft.com/office/powerpoint/2010/main" val="4136072690"/>
+      </p:ext>
+    </p:extLst>
+  </p:cSld>
+  <p:clrMapOvr>
+    <a:masterClrMapping/>
+  </p:clrMapOvr>
+  <p:timing>
+    <p:tnLst>
+      <p:par>
+        <p:cTn id="1" dur="indefinite" restart="never" nodeType="tmRoot"/>
+      </p:par>
+    </p:tnLst>
+  </p:timing>
+</p:sld>
+</file>
+
+<file path=ppt/slides/slide16.xml><?xml version="1.0" encoding="utf-8"?>
+<p:sld xmlns:a="http://schemas.openxmlformats.org/drawingml/2006/main" xmlns:r="http://schemas.openxmlformats.org/officeDocument/2006/relationships" xmlns:p="http://schemas.openxmlformats.org/presentationml/2006/main">
+  <p:cSld>
+    <p:spTree>
+      <p:nvGrpSpPr>
+        <p:cNvPr id="1" name=""/>
+        <p:cNvGrpSpPr/>
+        <p:nvPr/>
+      </p:nvGrpSpPr>
+      <p:grpSpPr>
+        <a:xfrm>
+          <a:off x="0" y="0"/>
+          <a:ext cx="0" cy="0"/>
+          <a:chOff x="0" y="0"/>
+          <a:chExt cx="0" cy="0"/>
+        </a:xfrm>
+      </p:grpSpPr>
+      <p:sp>
+        <p:nvSpPr>
+          <p:cNvPr id="2" name="Title 1">
+            <a:extLst>
+              <a:ext uri="{FF2B5EF4-FFF2-40B4-BE49-F238E27FC236}">
+                <a16:creationId xmlns:a16="http://schemas.microsoft.com/office/drawing/2014/main" id="{28D09562-4D8D-434E-AE6A-6CF89E6B1BBF}"/>
+              </a:ext>
+            </a:extLst>
+          </p:cNvPr>
+          <p:cNvSpPr>
+            <a:spLocks noGrp="1"/>
+          </p:cNvSpPr>
+          <p:nvPr>
+            <p:ph type="title"/>
+          </p:nvPr>
+        </p:nvSpPr>
+        <p:spPr/>
+        <p:txBody>
+          <a:bodyPr/>
+          <a:lstStyle/>
+          <a:p>
+            <a:r>
+              <a:rPr lang="en-US" dirty="0"/>
+              <a:t>Create a </a:t>
+            </a:r>
+            <a:r>
+              <a:rPr lang="en-US" dirty="0" err="1"/>
+              <a:t>Vite</a:t>
+            </a:r>
+            <a:r>
+              <a:rPr lang="en-US" dirty="0"/>
+              <a:t> project</a:t>
+            </a:r>
+            <a:endParaRPr lang="en-US" dirty="0"/>
+          </a:p>
+        </p:txBody>
+      </p:sp>
+      <p:sp>
+        <p:nvSpPr>
+          <p:cNvPr id="3" name="Text Placeholder 2">
+            <a:extLst>
+              <a:ext uri="{FF2B5EF4-FFF2-40B4-BE49-F238E27FC236}">
+                <a16:creationId xmlns:a16="http://schemas.microsoft.com/office/drawing/2014/main" id="{980004BA-4F47-4C5C-B300-EF35A2F015DB}"/>
+              </a:ext>
+            </a:extLst>
+          </p:cNvPr>
+          <p:cNvSpPr>
+            <a:spLocks noGrp="1"/>
+          </p:cNvSpPr>
+          <p:nvPr>
+            <p:ph type="body" sz="quarter" idx="11"/>
+          </p:nvPr>
+        </p:nvSpPr>
+        <p:spPr/>
+        <p:txBody>
+          <a:bodyPr>
+            <a:normAutofit/>
+          </a:bodyPr>
+          <a:lstStyle/>
+          <a:p>
+            <a:pPr marL="0" indent="0">
+              <a:buNone/>
+            </a:pPr>
+            <a:r>
+              <a:rPr lang="en-US" sz="2800" b="1" dirty="0" smtClean="0"/>
+              <a:t>Requirements:</a:t>
+            </a:r>
+          </a:p>
+          <a:p>
+            <a:pPr lvl="1">
+              <a:buFont typeface="Arial" panose="020B0604020202020204" pitchFamily="34" charset="0"/>
+              <a:buChar char="•"/>
+            </a:pPr>
+            <a:r>
+              <a:rPr lang="en-US" sz="2200" dirty="0"/>
+              <a:t>Node.js 12.2+</a:t>
+            </a:r>
+          </a:p>
+          <a:p>
+            <a:pPr lvl="1">
+              <a:buFont typeface="Arial" panose="020B0604020202020204" pitchFamily="34" charset="0"/>
+              <a:buChar char="•"/>
+            </a:pPr>
+            <a:r>
+              <a:rPr lang="en-US" sz="2200" dirty="0" err="1"/>
+              <a:t>npm</a:t>
+            </a:r>
+            <a:r>
+              <a:rPr lang="en-US" sz="2200" dirty="0"/>
+              <a:t> or yarn</a:t>
+            </a:r>
+          </a:p>
+          <a:p>
+            <a:pPr marL="0" indent="0">
+              <a:buNone/>
+            </a:pPr>
+            <a:endParaRPr lang="en-US" sz="2800" b="1" dirty="0" smtClean="0"/>
+          </a:p>
+          <a:p>
+            <a:pPr marL="0" indent="0">
+              <a:buNone/>
+            </a:pPr>
+            <a:r>
+              <a:rPr lang="en-US" sz="2800" b="1" dirty="0" smtClean="0"/>
+              <a:t>Run the following command:</a:t>
+            </a:r>
+          </a:p>
+          <a:p>
+            <a:pPr marL="457200" lvl="1" indent="0">
+              <a:buNone/>
+            </a:pPr>
+            <a:endParaRPr lang="en-US" sz="2200" dirty="0" smtClean="0"/>
+          </a:p>
+        </p:txBody>
+      </p:sp>
+      <p:pic>
+        <p:nvPicPr>
+          <p:cNvPr id="4" name="Picture 3"/>
+          <p:cNvPicPr>
+            <a:picLocks noChangeAspect="1"/>
+          </p:cNvPicPr>
+          <p:nvPr/>
+        </p:nvPicPr>
+        <p:blipFill>
+          <a:blip r:embed="rId2"/>
+          <a:stretch>
+            <a:fillRect/>
+          </a:stretch>
+        </p:blipFill>
+        <p:spPr>
+          <a:xfrm>
+            <a:off x="938783" y="3729923"/>
+            <a:ext cx="9373908" cy="952633"/>
+          </a:xfrm>
+          <a:prstGeom prst="rect">
+            <a:avLst/>
+          </a:prstGeom>
+        </p:spPr>
+      </p:pic>
+    </p:spTree>
+    <p:extLst>
+      <p:ext uri="{BB962C8B-B14F-4D97-AF65-F5344CB8AC3E}">
+        <p14:creationId xmlns:p14="http://schemas.microsoft.com/office/powerpoint/2010/main" val="1721504462"/>
+      </p:ext>
+    </p:extLst>
+  </p:cSld>
+  <p:clrMapOvr>
+    <a:masterClrMapping/>
+  </p:clrMapOvr>
+  <p:timing>
+    <p:tnLst>
+      <p:par>
+        <p:cTn id="1" dur="indefinite" restart="never" nodeType="tmRoot"/>
+      </p:par>
+    </p:tnLst>
+  </p:timing>
+</p:sld>
+</file>
+
+<file path=ppt/slides/slide17.xml><?xml version="1.0" encoding="utf-8"?>
+<p:sld xmlns:a="http://schemas.openxmlformats.org/drawingml/2006/main" xmlns:r="http://schemas.openxmlformats.org/officeDocument/2006/relationships" xmlns:p="http://schemas.openxmlformats.org/presentationml/2006/main">
+  <p:cSld>
+    <p:spTree>
+      <p:nvGrpSpPr>
+        <p:cNvPr id="1" name=""/>
+        <p:cNvGrpSpPr/>
+        <p:nvPr/>
+      </p:nvGrpSpPr>
+      <p:grpSpPr>
+        <a:xfrm>
+          <a:off x="0" y="0"/>
+          <a:ext cx="0" cy="0"/>
+          <a:chOff x="0" y="0"/>
+          <a:chExt cx="0" cy="0"/>
+        </a:xfrm>
+      </p:grpSpPr>
+      <p:sp>
+        <p:nvSpPr>
+          <p:cNvPr id="2" name="Title 1">
+            <a:extLst>
+              <a:ext uri="{FF2B5EF4-FFF2-40B4-BE49-F238E27FC236}">
+                <a16:creationId xmlns:a16="http://schemas.microsoft.com/office/drawing/2014/main" id="{28D09562-4D8D-434E-AE6A-6CF89E6B1BBF}"/>
+              </a:ext>
+            </a:extLst>
+          </p:cNvPr>
+          <p:cNvSpPr>
+            <a:spLocks noGrp="1"/>
+          </p:cNvSpPr>
+          <p:nvPr>
+            <p:ph type="title"/>
+          </p:nvPr>
+        </p:nvSpPr>
+        <p:spPr/>
+        <p:txBody>
+          <a:bodyPr/>
+          <a:lstStyle/>
+          <a:p>
+            <a:r>
+              <a:rPr lang="en-US" dirty="0"/>
+              <a:t>Create a </a:t>
+            </a:r>
+            <a:r>
+              <a:rPr lang="en-US" dirty="0" err="1"/>
+              <a:t>Vite</a:t>
+            </a:r>
+            <a:r>
+              <a:rPr lang="en-US" dirty="0"/>
+              <a:t> project</a:t>
+            </a:r>
+            <a:endParaRPr lang="en-US" dirty="0"/>
+          </a:p>
+        </p:txBody>
+      </p:sp>
+      <p:sp>
+        <p:nvSpPr>
+          <p:cNvPr id="3" name="Text Placeholder 2">
+            <a:extLst>
+              <a:ext uri="{FF2B5EF4-FFF2-40B4-BE49-F238E27FC236}">
+                <a16:creationId xmlns:a16="http://schemas.microsoft.com/office/drawing/2014/main" id="{980004BA-4F47-4C5C-B300-EF35A2F015DB}"/>
+              </a:ext>
+            </a:extLst>
+          </p:cNvPr>
+          <p:cNvSpPr>
+            <a:spLocks noGrp="1"/>
+          </p:cNvSpPr>
+          <p:nvPr>
+            <p:ph type="body" sz="quarter" idx="11"/>
+          </p:nvPr>
+        </p:nvSpPr>
+        <p:spPr/>
+        <p:txBody>
+          <a:bodyPr>
+            <a:normAutofit/>
+          </a:bodyPr>
+          <a:lstStyle/>
+          <a:p>
+            <a:r>
+              <a:rPr lang="en-US" sz="2000" dirty="0" smtClean="0"/>
+              <a:t>Enter your project name:</a:t>
+            </a:r>
+          </a:p>
+          <a:p>
+            <a:endParaRPr lang="en-US" sz="2400" dirty="0" smtClean="0"/>
+          </a:p>
+          <a:p>
+            <a:endParaRPr lang="en-US" sz="2400" dirty="0"/>
+          </a:p>
+          <a:p>
+            <a:endParaRPr lang="en-US" sz="2400" dirty="0" smtClean="0"/>
+          </a:p>
+          <a:p>
+            <a:r>
+              <a:rPr lang="en-US" sz="2000" dirty="0" smtClean="0"/>
+              <a:t>Choose a framework:</a:t>
+            </a:r>
+          </a:p>
+          <a:p>
+            <a:endParaRPr lang="en-US" sz="2400" dirty="0" smtClean="0"/>
+          </a:p>
+        </p:txBody>
+      </p:sp>
+      <p:pic>
+        <p:nvPicPr>
+          <p:cNvPr id="5" name="Picture 4"/>
+          <p:cNvPicPr>
+            <a:picLocks noChangeAspect="1"/>
+          </p:cNvPicPr>
+          <p:nvPr/>
+        </p:nvPicPr>
+        <p:blipFill>
+          <a:blip r:embed="rId2"/>
+          <a:stretch>
+            <a:fillRect/>
+          </a:stretch>
+        </p:blipFill>
+        <p:spPr>
+          <a:xfrm>
+            <a:off x="1187695" y="1628827"/>
+            <a:ext cx="4515480" cy="924054"/>
+          </a:xfrm>
+          <a:prstGeom prst="rect">
+            <a:avLst/>
+          </a:prstGeom>
+        </p:spPr>
+      </p:pic>
+      <p:pic>
+        <p:nvPicPr>
+          <p:cNvPr id="6" name="Picture 5"/>
+          <p:cNvPicPr>
+            <a:picLocks noChangeAspect="1"/>
+          </p:cNvPicPr>
+          <p:nvPr/>
+        </p:nvPicPr>
+        <p:blipFill>
+          <a:blip r:embed="rId3"/>
+          <a:stretch>
+            <a:fillRect/>
+          </a:stretch>
+        </p:blipFill>
+        <p:spPr>
+          <a:xfrm>
+            <a:off x="1187695" y="3352769"/>
+            <a:ext cx="5725169" cy="2217735"/>
+          </a:xfrm>
+          <a:prstGeom prst="rect">
+            <a:avLst/>
+          </a:prstGeom>
+        </p:spPr>
+      </p:pic>
+    </p:spTree>
+    <p:extLst>
+      <p:ext uri="{BB962C8B-B14F-4D97-AF65-F5344CB8AC3E}">
+        <p14:creationId xmlns:p14="http://schemas.microsoft.com/office/powerpoint/2010/main" val="3050769057"/>
+      </p:ext>
+    </p:extLst>
+  </p:cSld>
+  <p:clrMapOvr>
+    <a:masterClrMapping/>
+  </p:clrMapOvr>
+  <p:timing>
+    <p:tnLst>
+      <p:par>
+        <p:cTn id="1" dur="indefinite" restart="never" nodeType="tmRoot"/>
+      </p:par>
+    </p:tnLst>
+  </p:timing>
+</p:sld>
+</file>
+
+<file path=ppt/slides/slide18.xml><?xml version="1.0" encoding="utf-8"?>
+<p:sld xmlns:a="http://schemas.openxmlformats.org/drawingml/2006/main" xmlns:r="http://schemas.openxmlformats.org/officeDocument/2006/relationships" xmlns:p="http://schemas.openxmlformats.org/presentationml/2006/main">
+  <p:cSld>
+    <p:spTree>
+      <p:nvGrpSpPr>
+        <p:cNvPr id="1" name=""/>
+        <p:cNvGrpSpPr/>
+        <p:nvPr/>
+      </p:nvGrpSpPr>
+      <p:grpSpPr>
+        <a:xfrm>
+          <a:off x="0" y="0"/>
+          <a:ext cx="0" cy="0"/>
+          <a:chOff x="0" y="0"/>
+          <a:chExt cx="0" cy="0"/>
+        </a:xfrm>
+      </p:grpSpPr>
+      <p:sp>
+        <p:nvSpPr>
+          <p:cNvPr id="2" name="Title 1">
+            <a:extLst>
+              <a:ext uri="{FF2B5EF4-FFF2-40B4-BE49-F238E27FC236}">
+                <a16:creationId xmlns:a16="http://schemas.microsoft.com/office/drawing/2014/main" id="{28D09562-4D8D-434E-AE6A-6CF89E6B1BBF}"/>
+              </a:ext>
+            </a:extLst>
+          </p:cNvPr>
+          <p:cNvSpPr>
+            <a:spLocks noGrp="1"/>
+          </p:cNvSpPr>
+          <p:nvPr>
+            <p:ph type="title"/>
+          </p:nvPr>
+        </p:nvSpPr>
+        <p:spPr/>
+        <p:txBody>
+          <a:bodyPr/>
+          <a:lstStyle/>
+          <a:p>
+            <a:r>
+              <a:rPr lang="en-US" dirty="0"/>
+              <a:t>Create a </a:t>
+            </a:r>
+            <a:r>
+              <a:rPr lang="en-US" dirty="0" err="1"/>
+              <a:t>Vite</a:t>
+            </a:r>
+            <a:r>
+              <a:rPr lang="en-US" dirty="0"/>
+              <a:t> project</a:t>
+            </a:r>
+            <a:endParaRPr lang="en-US" dirty="0"/>
+          </a:p>
+        </p:txBody>
+      </p:sp>
+      <p:sp>
+        <p:nvSpPr>
+          <p:cNvPr id="3" name="Text Placeholder 2">
+            <a:extLst>
+              <a:ext uri="{FF2B5EF4-FFF2-40B4-BE49-F238E27FC236}">
+                <a16:creationId xmlns:a16="http://schemas.microsoft.com/office/drawing/2014/main" id="{980004BA-4F47-4C5C-B300-EF35A2F015DB}"/>
+              </a:ext>
+            </a:extLst>
+          </p:cNvPr>
+          <p:cNvSpPr>
+            <a:spLocks noGrp="1"/>
+          </p:cNvSpPr>
+          <p:nvPr>
+            <p:ph type="body" sz="quarter" idx="11"/>
+          </p:nvPr>
+        </p:nvSpPr>
+        <p:spPr/>
+        <p:txBody>
+          <a:bodyPr>
+            <a:normAutofit/>
+          </a:bodyPr>
+          <a:lstStyle/>
+          <a:p>
+            <a:r>
+              <a:rPr lang="en-US" sz="2000" dirty="0" smtClean="0"/>
+              <a:t>Choose a variant (SWC stands </a:t>
+            </a:r>
+            <a:r>
+              <a:rPr lang="en-US" sz="2000" dirty="0"/>
+              <a:t>for Speedy Web </a:t>
+            </a:r>
+            <a:r>
+              <a:rPr lang="en-US" sz="2000" dirty="0" smtClean="0"/>
+              <a:t>Compiler, a Rust-based bundler):</a:t>
+            </a:r>
+            <a:endParaRPr lang="en-US" sz="2000" dirty="0" smtClean="0"/>
+          </a:p>
+          <a:p>
+            <a:endParaRPr lang="en-US" sz="2400" dirty="0" smtClean="0"/>
+          </a:p>
+          <a:p>
+            <a:endParaRPr lang="en-US" sz="2400" dirty="0"/>
+          </a:p>
+          <a:p>
+            <a:endParaRPr lang="en-US" sz="2400" dirty="0" smtClean="0"/>
+          </a:p>
+          <a:p>
+            <a:pPr marL="0" indent="0">
+              <a:buNone/>
+            </a:pPr>
+            <a:endParaRPr lang="en-US" sz="2400" dirty="0"/>
+          </a:p>
+          <a:p>
+            <a:r>
+              <a:rPr lang="en-US" sz="2000" dirty="0" smtClean="0"/>
+              <a:t>Run the following command:</a:t>
+            </a:r>
+          </a:p>
+          <a:p>
+            <a:endParaRPr lang="en-US" sz="2400" dirty="0" smtClean="0"/>
+          </a:p>
+          <a:p>
+            <a:endParaRPr lang="en-US" sz="2400" dirty="0" smtClean="0"/>
+          </a:p>
+        </p:txBody>
+      </p:sp>
+      <p:pic>
+        <p:nvPicPr>
+          <p:cNvPr id="4" name="Picture 3"/>
+          <p:cNvPicPr>
+            <a:picLocks noChangeAspect="1"/>
+          </p:cNvPicPr>
+          <p:nvPr/>
+        </p:nvPicPr>
+        <p:blipFill>
+          <a:blip r:embed="rId2"/>
+          <a:stretch>
+            <a:fillRect/>
+          </a:stretch>
+        </p:blipFill>
+        <p:spPr>
+          <a:xfrm>
+            <a:off x="1187695" y="1609515"/>
+            <a:ext cx="4728473" cy="1665447"/>
+          </a:xfrm>
+          <a:prstGeom prst="rect">
+            <a:avLst/>
+          </a:prstGeom>
+        </p:spPr>
+      </p:pic>
+      <p:pic>
+        <p:nvPicPr>
+          <p:cNvPr id="7" name="Picture 6"/>
+          <p:cNvPicPr>
+            <a:picLocks noChangeAspect="1"/>
+          </p:cNvPicPr>
+          <p:nvPr/>
+        </p:nvPicPr>
+        <p:blipFill>
+          <a:blip r:embed="rId3"/>
+          <a:stretch>
+            <a:fillRect/>
+          </a:stretch>
+        </p:blipFill>
+        <p:spPr>
+          <a:xfrm>
+            <a:off x="1187695" y="3831777"/>
+            <a:ext cx="4609601" cy="2009185"/>
+          </a:xfrm>
+          <a:prstGeom prst="rect">
+            <a:avLst/>
+          </a:prstGeom>
+        </p:spPr>
+      </p:pic>
+    </p:spTree>
+    <p:extLst>
+      <p:ext uri="{BB962C8B-B14F-4D97-AF65-F5344CB8AC3E}">
+        <p14:creationId xmlns:p14="http://schemas.microsoft.com/office/powerpoint/2010/main" val="4260642262"/>
+      </p:ext>
+    </p:extLst>
+  </p:cSld>
+  <p:clrMapOvr>
+    <a:masterClrMapping/>
+  </p:clrMapOvr>
+  <p:timing>
+    <p:tnLst>
+      <p:par>
+        <p:cTn id="1" dur="indefinite" restart="never" nodeType="tmRoot"/>
+      </p:par>
+    </p:tnLst>
+  </p:timing>
+</p:sld>
+</file>
+
+<file path=ppt/slides/slide19.xml><?xml version="1.0" encoding="utf-8"?>
+<p:sld xmlns:a="http://schemas.openxmlformats.org/drawingml/2006/main" xmlns:r="http://schemas.openxmlformats.org/officeDocument/2006/relationships" xmlns:p="http://schemas.openxmlformats.org/presentationml/2006/main">
+  <p:cSld>
+    <p:spTree>
+      <p:nvGrpSpPr>
+        <p:cNvPr id="1" name=""/>
+        <p:cNvGrpSpPr/>
+        <p:nvPr/>
+      </p:nvGrpSpPr>
+      <p:grpSpPr>
+        <a:xfrm>
+          <a:off x="0" y="0"/>
+          <a:ext cx="0" cy="0"/>
+          <a:chOff x="0" y="0"/>
+          <a:chExt cx="0" cy="0"/>
+        </a:xfrm>
+      </p:grpSpPr>
+      <p:sp>
+        <p:nvSpPr>
+          <p:cNvPr id="2" name="Title 1">
+            <a:extLst>
+              <a:ext uri="{FF2B5EF4-FFF2-40B4-BE49-F238E27FC236}">
+                <a16:creationId xmlns:a16="http://schemas.microsoft.com/office/drawing/2014/main" id="{28D09562-4D8D-434E-AE6A-6CF89E6B1BBF}"/>
+              </a:ext>
+            </a:extLst>
+          </p:cNvPr>
+          <p:cNvSpPr>
+            <a:spLocks noGrp="1"/>
+          </p:cNvSpPr>
+          <p:nvPr>
+            <p:ph type="title"/>
+          </p:nvPr>
+        </p:nvSpPr>
+        <p:spPr/>
+        <p:txBody>
+          <a:bodyPr/>
+          <a:lstStyle/>
+          <a:p>
+            <a:r>
+              <a:rPr lang="en-US" dirty="0"/>
+              <a:t>Create a </a:t>
+            </a:r>
+            <a:r>
+              <a:rPr lang="en-US" dirty="0" err="1"/>
+              <a:t>Vite</a:t>
+            </a:r>
+            <a:r>
+              <a:rPr lang="en-US" dirty="0"/>
+              <a:t> project</a:t>
+            </a:r>
+            <a:endParaRPr lang="en-US" dirty="0"/>
+          </a:p>
+        </p:txBody>
+      </p:sp>
+      <p:sp>
+        <p:nvSpPr>
+          <p:cNvPr id="3" name="Text Placeholder 2">
+            <a:extLst>
+              <a:ext uri="{FF2B5EF4-FFF2-40B4-BE49-F238E27FC236}">
+                <a16:creationId xmlns:a16="http://schemas.microsoft.com/office/drawing/2014/main" id="{980004BA-4F47-4C5C-B300-EF35A2F015DB}"/>
+              </a:ext>
+            </a:extLst>
+          </p:cNvPr>
+          <p:cNvSpPr>
+            <a:spLocks noGrp="1"/>
+          </p:cNvSpPr>
+          <p:nvPr>
+            <p:ph type="body" sz="quarter" idx="11"/>
+          </p:nvPr>
+        </p:nvSpPr>
+        <p:spPr/>
+        <p:txBody>
+          <a:bodyPr>
+            <a:normAutofit/>
+          </a:bodyPr>
+          <a:lstStyle/>
+          <a:p>
+            <a:r>
+              <a:rPr lang="en-US" sz="2400" dirty="0" smtClean="0"/>
+              <a:t>The project is ready in 399ms</a:t>
+            </a:r>
+          </a:p>
+          <a:p>
+            <a:endParaRPr lang="en-US" sz="2400" dirty="0" smtClean="0"/>
+          </a:p>
+        </p:txBody>
+      </p:sp>
+      <p:pic>
+        <p:nvPicPr>
+          <p:cNvPr id="5" name="Picture 4"/>
+          <p:cNvPicPr>
+            <a:picLocks noChangeAspect="1"/>
+          </p:cNvPicPr>
+          <p:nvPr/>
+        </p:nvPicPr>
+        <p:blipFill>
+          <a:blip r:embed="rId2"/>
+          <a:stretch>
+            <a:fillRect/>
+          </a:stretch>
+        </p:blipFill>
+        <p:spPr>
+          <a:xfrm>
+            <a:off x="931200" y="1881067"/>
+            <a:ext cx="4168305" cy="1456493"/>
+          </a:xfrm>
+          <a:prstGeom prst="rect">
+            <a:avLst/>
+          </a:prstGeom>
+        </p:spPr>
+      </p:pic>
+      <p:pic>
+        <p:nvPicPr>
+          <p:cNvPr id="6" name="Picture 5"/>
+          <p:cNvPicPr>
+            <a:picLocks noChangeAspect="1"/>
+          </p:cNvPicPr>
+          <p:nvPr/>
+        </p:nvPicPr>
+        <p:blipFill>
+          <a:blip r:embed="rId3"/>
+          <a:stretch>
+            <a:fillRect/>
+          </a:stretch>
+        </p:blipFill>
+        <p:spPr>
+          <a:xfrm>
+            <a:off x="5740828" y="1881066"/>
+            <a:ext cx="6000424" cy="2818949"/>
+          </a:xfrm>
+          <a:prstGeom prst="rect">
+            <a:avLst/>
+          </a:prstGeom>
+        </p:spPr>
+      </p:pic>
+    </p:spTree>
+    <p:extLst>
+      <p:ext uri="{BB962C8B-B14F-4D97-AF65-F5344CB8AC3E}">
+        <p14:creationId xmlns:p14="http://schemas.microsoft.com/office/powerpoint/2010/main" val="4289205042"/>
+      </p:ext>
+    </p:extLst>
+  </p:cSld>
+  <p:clrMapOvr>
+    <a:masterClrMapping/>
+  </p:clrMapOvr>
+  <p:timing>
+    <p:tnLst>
+      <p:par>
+        <p:cTn id="1" dur="indefinite" restart="never" nodeType="tmRoot"/>
+      </p:par>
+    </p:tnLst>
+  </p:timing>
 </p:sld>
 </file>
 
@@ -19893,15 +21443,7 @@
             <a:pPr lvl="0"/>
             <a:r>
               <a:rPr lang="en-US" dirty="0" smtClean="0"/>
-              <a:t>Advantages </a:t>
-            </a:r>
-            <a:r>
-              <a:rPr lang="en-US" dirty="0" smtClean="0"/>
-              <a:t>&amp; </a:t>
-            </a:r>
-            <a:r>
-              <a:rPr lang="en-US" dirty="0" smtClean="0"/>
-              <a:t>disadvantages</a:t>
+              <a:t>Advantages &amp; disadvantages</a:t>
             </a:r>
           </a:p>
           <a:p>
@@ -19921,6 +21463,10 @@
             <a:endParaRPr lang="en-US" dirty="0"/>
           </a:p>
           <a:p>
+            <a:r>
+              <a:rPr lang="en-US" dirty="0" err="1" smtClean="0"/>
+              <a:t>Refereces</a:t>
+            </a:r>
             <a:endParaRPr lang="en-US" dirty="0"/>
           </a:p>
         </p:txBody>
@@ -19929,6 +21475,174 @@
     <p:extLst>
       <p:ext uri="{BB962C8B-B14F-4D97-AF65-F5344CB8AC3E}">
         <p14:creationId xmlns:p14="http://schemas.microsoft.com/office/powerpoint/2010/main" val="3172151810"/>
+      </p:ext>
+    </p:extLst>
+  </p:cSld>
+  <p:clrMapOvr>
+    <a:masterClrMapping/>
+  </p:clrMapOvr>
+</p:sld>
+</file>
+
+<file path=ppt/slides/slide20.xml><?xml version="1.0" encoding="utf-8"?>
+<p:sld xmlns:a="http://schemas.openxmlformats.org/drawingml/2006/main" xmlns:r="http://schemas.openxmlformats.org/officeDocument/2006/relationships" xmlns:p="http://schemas.openxmlformats.org/presentationml/2006/main">
+  <p:cSld>
+    <p:spTree>
+      <p:nvGrpSpPr>
+        <p:cNvPr id="1" name=""/>
+        <p:cNvGrpSpPr/>
+        <p:nvPr/>
+      </p:nvGrpSpPr>
+      <p:grpSpPr>
+        <a:xfrm>
+          <a:off x="0" y="0"/>
+          <a:ext cx="0" cy="0"/>
+          <a:chOff x="0" y="0"/>
+          <a:chExt cx="0" cy="0"/>
+        </a:xfrm>
+      </p:grpSpPr>
+      <p:sp>
+        <p:nvSpPr>
+          <p:cNvPr id="2" name="Title 1">
+            <a:extLst>
+              <a:ext uri="{FF2B5EF4-FFF2-40B4-BE49-F238E27FC236}">
+                <a16:creationId xmlns:a16="http://schemas.microsoft.com/office/drawing/2014/main" id="{28D09562-4D8D-434E-AE6A-6CF89E6B1BBF}"/>
+              </a:ext>
+            </a:extLst>
+          </p:cNvPr>
+          <p:cNvSpPr>
+            <a:spLocks noGrp="1"/>
+          </p:cNvSpPr>
+          <p:nvPr>
+            <p:ph type="title"/>
+          </p:nvPr>
+        </p:nvSpPr>
+        <p:spPr/>
+        <p:txBody>
+          <a:bodyPr/>
+          <a:lstStyle/>
+          <a:p>
+            <a:r>
+              <a:rPr lang="en-US" dirty="0" smtClean="0"/>
+              <a:t>References</a:t>
+            </a:r>
+            <a:endParaRPr lang="en-US" dirty="0"/>
+          </a:p>
+        </p:txBody>
+      </p:sp>
+      <p:sp>
+        <p:nvSpPr>
+          <p:cNvPr id="3" name="Text Placeholder 2">
+            <a:extLst>
+              <a:ext uri="{FF2B5EF4-FFF2-40B4-BE49-F238E27FC236}">
+                <a16:creationId xmlns:a16="http://schemas.microsoft.com/office/drawing/2014/main" id="{980004BA-4F47-4C5C-B300-EF35A2F015DB}"/>
+              </a:ext>
+            </a:extLst>
+          </p:cNvPr>
+          <p:cNvSpPr>
+            <a:spLocks noGrp="1"/>
+          </p:cNvSpPr>
+          <p:nvPr>
+            <p:ph type="body" sz="quarter" idx="11"/>
+          </p:nvPr>
+        </p:nvSpPr>
+        <p:spPr/>
+        <p:txBody>
+          <a:bodyPr>
+            <a:normAutofit/>
+          </a:bodyPr>
+          <a:lstStyle/>
+          <a:p>
+            <a:r>
+              <a:rPr lang="en-US" sz="2400" dirty="0" err="1">
+                <a:hlinkClick r:id="rId2"/>
+              </a:rPr>
+              <a:t>Vite</a:t>
+            </a:r>
+            <a:r>
+              <a:rPr lang="en-US" sz="2400" dirty="0">
+                <a:hlinkClick r:id="rId2"/>
+              </a:rPr>
+              <a:t> | Next Generation Frontend Tooling (</a:t>
+            </a:r>
+            <a:r>
+              <a:rPr lang="en-US" sz="2400" dirty="0" err="1">
+                <a:hlinkClick r:id="rId2"/>
+              </a:rPr>
+              <a:t>vitejs.dev</a:t>
+            </a:r>
+            <a:r>
+              <a:rPr lang="en-US" sz="2400" dirty="0" smtClean="0">
+                <a:hlinkClick r:id="rId2"/>
+              </a:rPr>
+              <a:t>)</a:t>
+            </a:r>
+            <a:endParaRPr lang="en-US" sz="2400" dirty="0" smtClean="0"/>
+          </a:p>
+          <a:p>
+            <a:r>
+              <a:rPr lang="en-US" sz="2400" dirty="0">
+                <a:hlinkClick r:id="rId3"/>
+              </a:rPr>
+              <a:t>Learn </a:t>
+            </a:r>
+            <a:r>
+              <a:rPr lang="en-US" sz="2400" dirty="0" err="1">
+                <a:hlinkClick r:id="rId3"/>
+              </a:rPr>
+              <a:t>Vite</a:t>
+            </a:r>
+            <a:r>
+              <a:rPr lang="en-US" sz="2400" dirty="0">
+                <a:hlinkClick r:id="rId3"/>
+              </a:rPr>
+              <a:t> with Evan You - YouTube</a:t>
+            </a:r>
+            <a:endParaRPr lang="en-US" sz="2400" dirty="0" smtClean="0"/>
+          </a:p>
+        </p:txBody>
+      </p:sp>
+    </p:spTree>
+    <p:extLst>
+      <p:ext uri="{BB962C8B-B14F-4D97-AF65-F5344CB8AC3E}">
+        <p14:creationId xmlns:p14="http://schemas.microsoft.com/office/powerpoint/2010/main" val="1948502852"/>
+      </p:ext>
+    </p:extLst>
+  </p:cSld>
+  <p:clrMapOvr>
+    <a:masterClrMapping/>
+  </p:clrMapOvr>
+  <p:timing>
+    <p:tnLst>
+      <p:par>
+        <p:cTn id="1" dur="indefinite" restart="never" nodeType="tmRoot"/>
+      </p:par>
+    </p:tnLst>
+  </p:timing>
+</p:sld>
+</file>
+
+<file path=ppt/slides/slide21.xml><?xml version="1.0" encoding="utf-8"?>
+<p:sld xmlns:a="http://schemas.openxmlformats.org/drawingml/2006/main" xmlns:r="http://schemas.openxmlformats.org/officeDocument/2006/relationships" xmlns:p="http://schemas.openxmlformats.org/presentationml/2006/main">
+  <p:cSld>
+    <p:spTree>
+      <p:nvGrpSpPr>
+        <p:cNvPr id="1" name=""/>
+        <p:cNvGrpSpPr/>
+        <p:nvPr/>
+      </p:nvGrpSpPr>
+      <p:grpSpPr>
+        <a:xfrm>
+          <a:off x="0" y="0"/>
+          <a:ext cx="0" cy="0"/>
+          <a:chOff x="0" y="0"/>
+          <a:chExt cx="0" cy="0"/>
+        </a:xfrm>
+      </p:grpSpPr>
+    </p:spTree>
+    <p:extLst>
+      <p:ext uri="{BB962C8B-B14F-4D97-AF65-F5344CB8AC3E}">
+        <p14:creationId xmlns:p14="http://schemas.microsoft.com/office/powerpoint/2010/main" val="610108693"/>
       </p:ext>
     </p:extLst>
   </p:cSld>
@@ -20469,7 +22183,6 @@
               <a:rPr lang="en-US" sz="2400" dirty="0" smtClean="0"/>
               <a:t>support</a:t>
             </a:r>
-            <a:endParaRPr lang="en-US" sz="2400" dirty="0" smtClean="0"/>
           </a:p>
           <a:p>
             <a:r>
@@ -20618,82 +22331,65 @@
           <a:lstStyle/>
           <a:p>
             <a:r>
-              <a:rPr lang="en-US" sz="2000" dirty="0" smtClean="0"/>
-              <a:t>Bundles dependencies 10-100x faster than other JavaScript-based bundlers</a:t>
-            </a:r>
-          </a:p>
-          <a:p>
-            <a:endParaRPr lang="en-US" sz="2000" dirty="0" smtClean="0"/>
-          </a:p>
-        </p:txBody>
-      </p:sp>
-      <p:pic>
-        <p:nvPicPr>
-          <p:cNvPr id="5" name="Picture 4"/>
-          <p:cNvPicPr>
-            <a:picLocks noChangeAspect="1"/>
-          </p:cNvPicPr>
-          <p:nvPr/>
-        </p:nvPicPr>
-        <p:blipFill>
-          <a:blip r:embed="rId2"/>
-          <a:stretch>
-            <a:fillRect/>
-          </a:stretch>
-        </p:blipFill>
-        <p:spPr>
-          <a:xfrm>
-            <a:off x="1607440" y="2845709"/>
-            <a:ext cx="8754531" cy="2223906"/>
-          </a:xfrm>
-          <a:prstGeom prst="rect">
-            <a:avLst/>
-          </a:prstGeom>
-        </p:spPr>
-      </p:pic>
-      <p:sp>
-        <p:nvSpPr>
-          <p:cNvPr id="6" name="TextBox 5"/>
-          <p:cNvSpPr txBox="1"/>
-          <p:nvPr/>
-        </p:nvSpPr>
-        <p:spPr>
-          <a:xfrm>
-            <a:off x="5239512" y="5153794"/>
-            <a:ext cx="1870448" cy="307777"/>
-          </a:xfrm>
-          <a:prstGeom prst="rect">
-            <a:avLst/>
-          </a:prstGeom>
-          <a:noFill/>
-        </p:spPr>
-        <p:txBody>
-          <a:bodyPr wrap="none" rtlCol="0">
-            <a:spAutoFit/>
-          </a:bodyPr>
-          <a:lstStyle/>
-          <a:p>
-            <a:pPr algn="l"/>
-            <a:r>
-              <a:rPr lang="en-US" sz="1400" i="1" dirty="0" smtClean="0">
-                <a:solidFill>
-                  <a:schemeClr val="bg2"/>
-                </a:solidFill>
-              </a:rPr>
-              <a:t>Vishnu Sivan (dev.to)</a:t>
-            </a:r>
-            <a:endParaRPr lang="en-US" sz="1400" i="1" dirty="0" smtClean="0">
-              <a:solidFill>
-                <a:schemeClr val="bg2"/>
-              </a:solidFill>
-            </a:endParaRPr>
+              <a:rPr lang="en-US" sz="2400" dirty="0" smtClean="0"/>
+              <a:t>Support </a:t>
+            </a:r>
+            <a:r>
+              <a:rPr lang="en-US" sz="2400" dirty="0"/>
+              <a:t>for Hot Module Replacement (HMR</a:t>
+            </a:r>
+            <a:r>
+              <a:rPr lang="en-US" sz="2400" dirty="0" smtClean="0"/>
+              <a:t>)</a:t>
+            </a:r>
+          </a:p>
+          <a:p>
+            <a:r>
+              <a:rPr lang="en-US" sz="2400" dirty="0" err="1"/>
+              <a:t>Vite</a:t>
+            </a:r>
+            <a:r>
+              <a:rPr lang="en-US" sz="2400" dirty="0"/>
+              <a:t> 4.0 now uses Rollup 3.0 at build </a:t>
+            </a:r>
+            <a:r>
+              <a:rPr lang="en-US" sz="2400" dirty="0" smtClean="0"/>
+              <a:t>time</a:t>
+            </a:r>
+          </a:p>
+          <a:p>
+            <a:r>
+              <a:rPr lang="en-US" sz="2400" dirty="0" err="1"/>
+              <a:t>Vite</a:t>
+            </a:r>
+            <a:r>
+              <a:rPr lang="en-US" sz="2400" dirty="0"/>
+              <a:t> 4.0: adds support for SWC, a Rust-based bundler that claims </a:t>
+            </a:r>
+            <a:r>
+              <a:rPr lang="en-US" sz="2400" dirty="0" smtClean="0"/>
+              <a:t>speed </a:t>
+            </a:r>
+            <a:r>
+              <a:rPr lang="en-US" sz="2400" dirty="0"/>
+              <a:t>improvement over Babel</a:t>
+            </a:r>
+          </a:p>
+          <a:p>
+            <a:pPr marL="0" indent="0">
+              <a:buNone/>
+            </a:pPr>
+            <a:endParaRPr lang="en-US" sz="2400" dirty="0"/>
+          </a:p>
+          <a:p>
+            <a:endParaRPr lang="en-US" sz="2400" dirty="0" smtClean="0"/>
           </a:p>
         </p:txBody>
       </p:sp>
     </p:spTree>
     <p:extLst>
       <p:ext uri="{BB962C8B-B14F-4D97-AF65-F5344CB8AC3E}">
-        <p14:creationId xmlns:p14="http://schemas.microsoft.com/office/powerpoint/2010/main" val="3892531254"/>
+        <p14:creationId xmlns:p14="http://schemas.microsoft.com/office/powerpoint/2010/main" val="2833641435"/>
       </p:ext>
     </p:extLst>
   </p:cSld>
@@ -20780,54 +22476,18 @@
           <a:lstStyle/>
           <a:p>
             <a:r>
-              <a:rPr lang="en-US" sz="2400" dirty="0" smtClean="0"/>
-              <a:t>Native ES modules</a:t>
-            </a:r>
-          </a:p>
-        </p:txBody>
-      </p:sp>
-      <p:sp>
-        <p:nvSpPr>
-          <p:cNvPr id="6" name="TextBox 5"/>
-          <p:cNvSpPr txBox="1"/>
-          <p:nvPr/>
-        </p:nvSpPr>
-        <p:spPr>
-          <a:xfrm>
-            <a:off x="5239512" y="5122389"/>
-            <a:ext cx="1870448" cy="307777"/>
-          </a:xfrm>
-          <a:prstGeom prst="rect">
-            <a:avLst/>
-          </a:prstGeom>
-          <a:noFill/>
-        </p:spPr>
-        <p:txBody>
-          <a:bodyPr wrap="none" rtlCol="0">
-            <a:spAutoFit/>
-          </a:bodyPr>
-          <a:lstStyle/>
-          <a:p>
-            <a:pPr algn="l"/>
-            <a:r>
-              <a:rPr lang="en-US" sz="1400" i="1" dirty="0" smtClean="0">
-                <a:solidFill>
-                  <a:schemeClr val="bg2"/>
-                </a:solidFill>
-              </a:rPr>
-              <a:t>Vishnu Sivan (dev.to)</a:t>
-            </a:r>
-            <a:endParaRPr lang="en-US" sz="1400" i="1" dirty="0" smtClean="0">
-              <a:solidFill>
-                <a:schemeClr val="bg2"/>
-              </a:solidFill>
-            </a:endParaRPr>
+              <a:rPr lang="en-US" sz="2000" dirty="0" smtClean="0"/>
+              <a:t>Bundles dependencies 10-100x faster than other JavaScript-based bundlers</a:t>
+            </a:r>
+          </a:p>
+          <a:p>
+            <a:endParaRPr lang="en-US" sz="2000" dirty="0" smtClean="0"/>
           </a:p>
         </p:txBody>
       </p:sp>
       <p:pic>
         <p:nvPicPr>
-          <p:cNvPr id="4" name="Picture 3"/>
+          <p:cNvPr id="5" name="Picture 4"/>
           <p:cNvPicPr>
             <a:picLocks noChangeAspect="1"/>
           </p:cNvPicPr>
@@ -20841,8 +22501,8 @@
         </p:blipFill>
         <p:spPr>
           <a:xfrm>
-            <a:off x="806679" y="2312720"/>
-            <a:ext cx="10736114" cy="2706652"/>
+            <a:off x="1607440" y="2845709"/>
+            <a:ext cx="8754531" cy="2223906"/>
           </a:xfrm>
           <a:prstGeom prst="rect">
             <a:avLst/>
@@ -20851,14 +22511,14 @@
       </p:pic>
       <p:sp>
         <p:nvSpPr>
-          <p:cNvPr id="8" name="TextBox 7"/>
+          <p:cNvPr id="6" name="TextBox 5"/>
           <p:cNvSpPr txBox="1"/>
           <p:nvPr/>
         </p:nvSpPr>
         <p:spPr>
           <a:xfrm>
-            <a:off x="1442639" y="1891880"/>
-            <a:ext cx="3796873" cy="369332"/>
+            <a:off x="5239512" y="5153794"/>
+            <a:ext cx="1870448" cy="307777"/>
           </a:xfrm>
           <a:prstGeom prst="rect">
             <a:avLst/>
@@ -20871,80 +22531,22 @@
           </a:bodyPr>
           <a:lstStyle/>
           <a:p>
-            <a:r>
-              <a:rPr lang="en-US" dirty="0" err="1" smtClean="0">
-                <a:solidFill>
-                  <a:schemeClr val="bg1"/>
+            <a:pPr algn="l"/>
+            <a:r>
+              <a:rPr lang="en-US" sz="1400" i="1" dirty="0" smtClean="0">
+                <a:solidFill>
+                  <a:schemeClr val="bg2"/>
                 </a:solidFill>
               </a:rPr>
-              <a:t>Webpack</a:t>
-            </a:r>
-            <a:r>
-              <a:rPr lang="en-US" dirty="0" smtClean="0">
-                <a:solidFill>
-                  <a:schemeClr val="bg1"/>
-                </a:solidFill>
-              </a:rPr>
-              <a:t> bundles the entire project</a:t>
-            </a:r>
-            <a:endParaRPr lang="en-US" dirty="0" smtClean="0">
-              <a:solidFill>
-                <a:schemeClr val="bg1"/>
-              </a:solidFill>
-            </a:endParaRPr>
-          </a:p>
-        </p:txBody>
-      </p:sp>
-      <p:sp>
-        <p:nvSpPr>
-          <p:cNvPr id="9" name="TextBox 8"/>
-          <p:cNvSpPr txBox="1"/>
-          <p:nvPr/>
-        </p:nvSpPr>
-        <p:spPr>
-          <a:xfrm>
-            <a:off x="7109960" y="1891880"/>
-            <a:ext cx="3463449" cy="369332"/>
-          </a:xfrm>
-          <a:prstGeom prst="rect">
-            <a:avLst/>
-          </a:prstGeom>
-          <a:noFill/>
-        </p:spPr>
-        <p:txBody>
-          <a:bodyPr wrap="none" rtlCol="0">
-            <a:spAutoFit/>
-          </a:bodyPr>
-          <a:lstStyle/>
-          <a:p>
-            <a:r>
-              <a:rPr lang="en-US" dirty="0" err="1" smtClean="0">
-                <a:solidFill>
-                  <a:schemeClr val="bg1"/>
-                </a:solidFill>
-              </a:rPr>
-              <a:t>Vite</a:t>
-            </a:r>
-            <a:r>
-              <a:rPr lang="en-US" dirty="0" smtClean="0">
-                <a:solidFill>
-                  <a:schemeClr val="bg1"/>
-                </a:solidFill>
-              </a:rPr>
-              <a:t> only bundles needed pages</a:t>
-            </a:r>
-            <a:endParaRPr lang="en-US" dirty="0" smtClean="0">
-              <a:solidFill>
-                <a:schemeClr val="bg1"/>
-              </a:solidFill>
-            </a:endParaRPr>
+              <a:t>Vishnu Sivan (dev.to)</a:t>
+            </a:r>
           </a:p>
         </p:txBody>
       </p:sp>
     </p:spTree>
     <p:extLst>
       <p:ext uri="{BB962C8B-B14F-4D97-AF65-F5344CB8AC3E}">
-        <p14:creationId xmlns:p14="http://schemas.microsoft.com/office/powerpoint/2010/main" val="1787857065"/>
+        <p14:creationId xmlns:p14="http://schemas.microsoft.com/office/powerpoint/2010/main" val="3892531254"/>
       </p:ext>
     </p:extLst>
   </p:cSld>

</xml_diff>

<commit_message>
[WIP] Add demo and slide for artillery
</commit_message>
<xml_diff>
--- a/vite/slide/NT_Vitejs.pptx
+++ b/vite/slide/NT_Vitejs.pptx
@@ -264,7 +264,7 @@
           <a:p>
             <a:fld id="{341919A8-FDE9-4149-8ED6-0DC54AFFEC26}" type="datetimeFigureOut">
               <a:rPr lang="en-US" smtClean="0"/>
-              <a:t>4/7/2023</a:t>
+              <a:t>4/12/2023</a:t>
             </a:fld>
             <a:endParaRPr lang="en-US"/>
           </a:p>
@@ -434,7 +434,7 @@
           <a:p>
             <a:fld id="{341919A8-FDE9-4149-8ED6-0DC54AFFEC26}" type="datetimeFigureOut">
               <a:rPr lang="en-US" smtClean="0"/>
-              <a:t>4/7/2023</a:t>
+              <a:t>4/12/2023</a:t>
             </a:fld>
             <a:endParaRPr lang="en-US"/>
           </a:p>
@@ -614,7 +614,7 @@
           <a:p>
             <a:fld id="{341919A8-FDE9-4149-8ED6-0DC54AFFEC26}" type="datetimeFigureOut">
               <a:rPr lang="en-US" smtClean="0"/>
-              <a:t>4/7/2023</a:t>
+              <a:t>4/12/2023</a:t>
             </a:fld>
             <a:endParaRPr lang="en-US"/>
           </a:p>
@@ -3676,7 +3676,7 @@
           <a:p>
             <a:fld id="{341919A8-FDE9-4149-8ED6-0DC54AFFEC26}" type="datetimeFigureOut">
               <a:rPr lang="en-US" smtClean="0"/>
-              <a:t>4/7/2023</a:t>
+              <a:t>4/12/2023</a:t>
             </a:fld>
             <a:endParaRPr lang="en-US"/>
           </a:p>
@@ -6320,7 +6320,7 @@
           <a:p>
             <a:fld id="{341919A8-FDE9-4149-8ED6-0DC54AFFEC26}" type="datetimeFigureOut">
               <a:rPr lang="en-US" smtClean="0"/>
-              <a:t>4/7/2023</a:t>
+              <a:t>4/12/2023</a:t>
             </a:fld>
             <a:endParaRPr lang="en-US"/>
           </a:p>
@@ -12174,7 +12174,7 @@
           <a:p>
             <a:fld id="{341919A8-FDE9-4149-8ED6-0DC54AFFEC26}" type="datetimeFigureOut">
               <a:rPr lang="en-US" smtClean="0"/>
-              <a:t>4/7/2023</a:t>
+              <a:t>4/12/2023</a:t>
             </a:fld>
             <a:endParaRPr lang="en-US"/>
           </a:p>
@@ -17623,7 +17623,7 @@
           <a:p>
             <a:fld id="{341919A8-FDE9-4149-8ED6-0DC54AFFEC26}" type="datetimeFigureOut">
               <a:rPr lang="en-US" smtClean="0"/>
-              <a:t>4/7/2023</a:t>
+              <a:t>4/12/2023</a:t>
             </a:fld>
             <a:endParaRPr lang="en-US"/>
           </a:p>
@@ -17741,7 +17741,7 @@
           <a:p>
             <a:fld id="{341919A8-FDE9-4149-8ED6-0DC54AFFEC26}" type="datetimeFigureOut">
               <a:rPr lang="en-US" smtClean="0"/>
-              <a:t>4/7/2023</a:t>
+              <a:t>4/12/2023</a:t>
             </a:fld>
             <a:endParaRPr lang="en-US"/>
           </a:p>
@@ -17836,7 +17836,7 @@
           <a:p>
             <a:fld id="{341919A8-FDE9-4149-8ED6-0DC54AFFEC26}" type="datetimeFigureOut">
               <a:rPr lang="en-US" smtClean="0"/>
-              <a:t>4/7/2023</a:t>
+              <a:t>4/12/2023</a:t>
             </a:fld>
             <a:endParaRPr lang="en-US"/>
           </a:p>
@@ -18113,7 +18113,7 @@
           <a:p>
             <a:fld id="{341919A8-FDE9-4149-8ED6-0DC54AFFEC26}" type="datetimeFigureOut">
               <a:rPr lang="en-US" smtClean="0"/>
-              <a:t>4/7/2023</a:t>
+              <a:t>4/12/2023</a:t>
             </a:fld>
             <a:endParaRPr lang="en-US"/>
           </a:p>
@@ -18366,7 +18366,7 @@
           <a:p>
             <a:fld id="{341919A8-FDE9-4149-8ED6-0DC54AFFEC26}" type="datetimeFigureOut">
               <a:rPr lang="en-US" smtClean="0"/>
-              <a:t>4/7/2023</a:t>
+              <a:t>4/12/2023</a:t>
             </a:fld>
             <a:endParaRPr lang="en-US"/>
           </a:p>
@@ -18579,7 +18579,7 @@
           <a:p>
             <a:fld id="{341919A8-FDE9-4149-8ED6-0DC54AFFEC26}" type="datetimeFigureOut">
               <a:rPr lang="en-US" smtClean="0"/>
-              <a:t>4/7/2023</a:t>
+              <a:t>4/12/2023</a:t>
             </a:fld>
             <a:endParaRPr lang="en-US"/>
           </a:p>
@@ -20537,8 +20537,8 @@
           </a:p>
           <a:p>
             <a:r>
-              <a:rPr lang="en-US" sz="2400" dirty="0" smtClean="0"/>
-              <a:t>Using </a:t>
+              <a:rPr lang="en-US" sz="2400" smtClean="0"/>
+              <a:t>Uses </a:t>
             </a:r>
             <a:r>
               <a:rPr lang="en-US" sz="2400" dirty="0"/>
@@ -20561,6 +20561,12 @@
             <a:r>
               <a:rPr lang="en-US" sz="2400" dirty="0" smtClean="0"/>
               <a:t>Lack of Jest support</a:t>
+            </a:r>
+          </a:p>
+          <a:p>
+            <a:r>
+              <a:rPr lang="en-US" sz="2400" dirty="0" smtClean="0"/>
+              <a:t>No type checking</a:t>
             </a:r>
             <a:endParaRPr lang="en-US" sz="2400" dirty="0"/>
           </a:p>

</xml_diff>